<commit_message>
Initial template for Design Doc
</commit_message>
<xml_diff>
--- a/collateral/Team 55 Sprint 7.pptx
+++ b/collateral/Team 55 Sprint 7.pptx
@@ -5818,6 +5818,12 @@
             </a:r>
           </a:p>
           <a:p>
+            <a:r>
+              <a:rPr lang="en-US" dirty="0"/>
+              <a:t>Working through Sprint 8 deliverables</a:t>
+            </a:r>
+          </a:p>
+          <a:p>
             <a:endParaRPr lang="en-US" dirty="0"/>
           </a:p>
         </p:txBody>
@@ -5918,6 +5924,55 @@
                                           <p:spTgt spid="8">
                                             <p:txEl>
                                               <p:pRg st="1" end="1"/>
+                                            </p:txEl>
+                                          </p:spTgt>
+                                        </p:tgtEl>
+                                        <p:attrNameLst>
+                                          <p:attrName>style.visibility</p:attrName>
+                                        </p:attrNameLst>
+                                      </p:cBhvr>
+                                      <p:to>
+                                        <p:strVal val="visible"/>
+                                      </p:to>
+                                    </p:set>
+                                  </p:childTnLst>
+                                </p:cTn>
+                              </p:par>
+                            </p:childTnLst>
+                          </p:cTn>
+                        </p:par>
+                      </p:childTnLst>
+                    </p:cTn>
+                  </p:par>
+                  <p:par>
+                    <p:cTn id="11" fill="hold">
+                      <p:stCondLst>
+                        <p:cond delay="indefinite"/>
+                      </p:stCondLst>
+                      <p:childTnLst>
+                        <p:par>
+                          <p:cTn id="12" fill="hold">
+                            <p:stCondLst>
+                              <p:cond delay="0"/>
+                            </p:stCondLst>
+                            <p:childTnLst>
+                              <p:par>
+                                <p:cTn id="13" presetID="1" presetClass="entr" presetSubtype="0" fill="hold" grpId="0" nodeType="clickEffect">
+                                  <p:stCondLst>
+                                    <p:cond delay="0"/>
+                                  </p:stCondLst>
+                                  <p:childTnLst>
+                                    <p:set>
+                                      <p:cBhvr>
+                                        <p:cTn id="14" dur="1" fill="hold">
+                                          <p:stCondLst>
+                                            <p:cond delay="0"/>
+                                          </p:stCondLst>
+                                        </p:cTn>
+                                        <p:tgtEl>
+                                          <p:spTgt spid="8">
+                                            <p:txEl>
+                                              <p:pRg st="2" end="2"/>
                                             </p:txEl>
                                           </p:spTgt>
                                         </p:tgtEl>

</xml_diff>

<commit_message>
Initial check in of final presentation.  Updated design doc.
</commit_message>
<xml_diff>
--- a/collateral/Team 55 Sprint 7.pptx
+++ b/collateral/Team 55 Sprint 7.pptx
@@ -5814,7 +5814,7 @@
           <a:p>
             <a:r>
               <a:rPr lang="en-US" dirty="0"/>
-              <a:t>Started process of cleaning/commenting code for code walkthrough and final delivery</a:t>
+              <a:t>Cleaned up code and added comments in preparation for code-walkthrough with CDC</a:t>
             </a:r>
           </a:p>
           <a:p>
@@ -6254,19 +6254,19 @@
           <a:p>
             <a:r>
               <a:rPr lang="en-US" dirty="0"/>
-              <a:t>Finish code commenting and refactoring</a:t>
-            </a:r>
-          </a:p>
-          <a:p>
-            <a:r>
-              <a:rPr lang="en-US" dirty="0"/>
-              <a:t>Final demonstration and code-walkthrough with the CDC</a:t>
-            </a:r>
-          </a:p>
-          <a:p>
-            <a:r>
-              <a:rPr lang="en-US" dirty="0"/>
-              <a:t>Finish documentation and demonstration for final deliverable</a:t>
+              <a:t>Conduct final demonstration and code-walkthrough with the CDC</a:t>
+            </a:r>
+          </a:p>
+          <a:p>
+            <a:r>
+              <a:rPr lang="en-US" dirty="0"/>
+              <a:t>Finish documentation and demonstration video for final deliverable</a:t>
+            </a:r>
+          </a:p>
+          <a:p>
+            <a:r>
+              <a:rPr lang="en-US" dirty="0"/>
+              <a:t>Deliver code and documentation to CDC</a:t>
             </a:r>
           </a:p>
           <a:p>

</xml_diff>